<commit_message>
adding slides for Python files and exceptions
</commit_message>
<xml_diff>
--- a/slides/Python_ready_set_go.pptx
+++ b/slides/Python_ready_set_go.pptx
@@ -17367,7 +17367,7 @@
               <a:rPr lang="en-US" sz="1800" dirty="0">
                 <a:latin typeface="Courier" pitchFamily="2" charset="0"/>
               </a:rPr>
-              <a:t> (entry[1]&gt;60):</a:t>
+              <a:t> (grade&gt;60):</a:t>
             </a:r>
           </a:p>
           <a:p>
@@ -17387,7 +17387,7 @@
               <a:rPr lang="en-US" sz="1800" dirty="0">
                 <a:latin typeface="Courier" pitchFamily="2" charset="0"/>
               </a:rPr>
-              <a:t>(entry[0] + ": approved")</a:t>
+              <a:t>(name + ": approved")</a:t>
             </a:r>
           </a:p>
           <a:p>
@@ -17427,7 +17427,7 @@
               <a:rPr lang="en-US" sz="1800" dirty="0">
                 <a:latin typeface="Courier" pitchFamily="2" charset="0"/>
               </a:rPr>
-              <a:t>(entry[0] + ": talk to the instructor")</a:t>
+              <a:t>(name + ": talk to the instructor")</a:t>
             </a:r>
           </a:p>
           <a:p>

</xml_diff>